<commit_message>
no more bivariate plot
</commit_message>
<xml_diff>
--- a/Map formatting.pptx
+++ b/Map formatting.pptx
@@ -6,7 +6,6 @@
   </p:sldMasterIdLst>
   <p:sldIdLst>
     <p:sldId id="257" r:id="rId2"/>
-    <p:sldId id="256" r:id="rId3"/>
   </p:sldIdLst>
   <p:sldSz cx="20116800" cy="9144000"/>
   <p:notesSz cx="6858000" cy="9144000"/>
@@ -244,7 +243,7 @@
           <a:p>
             <a:fld id="{8CCA23B4-60B8-465C-B45F-AA27EB463BD9}" type="datetimeFigureOut">
               <a:rPr lang="en-US" smtClean="0"/>
-              <a:t>7/2/2021</a:t>
+              <a:t>2/6/2022</a:t>
             </a:fld>
             <a:endParaRPr lang="en-US"/>
           </a:p>
@@ -414,7 +413,7 @@
           <a:p>
             <a:fld id="{8CCA23B4-60B8-465C-B45F-AA27EB463BD9}" type="datetimeFigureOut">
               <a:rPr lang="en-US" smtClean="0"/>
-              <a:t>7/2/2021</a:t>
+              <a:t>2/6/2022</a:t>
             </a:fld>
             <a:endParaRPr lang="en-US"/>
           </a:p>
@@ -594,7 +593,7 @@
           <a:p>
             <a:fld id="{8CCA23B4-60B8-465C-B45F-AA27EB463BD9}" type="datetimeFigureOut">
               <a:rPr lang="en-US" smtClean="0"/>
-              <a:t>7/2/2021</a:t>
+              <a:t>2/6/2022</a:t>
             </a:fld>
             <a:endParaRPr lang="en-US"/>
           </a:p>
@@ -764,7 +763,7 @@
           <a:p>
             <a:fld id="{8CCA23B4-60B8-465C-B45F-AA27EB463BD9}" type="datetimeFigureOut">
               <a:rPr lang="en-US" smtClean="0"/>
-              <a:t>7/2/2021</a:t>
+              <a:t>2/6/2022</a:t>
             </a:fld>
             <a:endParaRPr lang="en-US"/>
           </a:p>
@@ -1010,7 +1009,7 @@
           <a:p>
             <a:fld id="{8CCA23B4-60B8-465C-B45F-AA27EB463BD9}" type="datetimeFigureOut">
               <a:rPr lang="en-US" smtClean="0"/>
-              <a:t>7/2/2021</a:t>
+              <a:t>2/6/2022</a:t>
             </a:fld>
             <a:endParaRPr lang="en-US"/>
           </a:p>
@@ -1242,7 +1241,7 @@
           <a:p>
             <a:fld id="{8CCA23B4-60B8-465C-B45F-AA27EB463BD9}" type="datetimeFigureOut">
               <a:rPr lang="en-US" smtClean="0"/>
-              <a:t>7/2/2021</a:t>
+              <a:t>2/6/2022</a:t>
             </a:fld>
             <a:endParaRPr lang="en-US"/>
           </a:p>
@@ -1609,7 +1608,7 @@
           <a:p>
             <a:fld id="{8CCA23B4-60B8-465C-B45F-AA27EB463BD9}" type="datetimeFigureOut">
               <a:rPr lang="en-US" smtClean="0"/>
-              <a:t>7/2/2021</a:t>
+              <a:t>2/6/2022</a:t>
             </a:fld>
             <a:endParaRPr lang="en-US"/>
           </a:p>
@@ -1727,7 +1726,7 @@
           <a:p>
             <a:fld id="{8CCA23B4-60B8-465C-B45F-AA27EB463BD9}" type="datetimeFigureOut">
               <a:rPr lang="en-US" smtClean="0"/>
-              <a:t>7/2/2021</a:t>
+              <a:t>2/6/2022</a:t>
             </a:fld>
             <a:endParaRPr lang="en-US"/>
           </a:p>
@@ -1822,7 +1821,7 @@
           <a:p>
             <a:fld id="{8CCA23B4-60B8-465C-B45F-AA27EB463BD9}" type="datetimeFigureOut">
               <a:rPr lang="en-US" smtClean="0"/>
-              <a:t>7/2/2021</a:t>
+              <a:t>2/6/2022</a:t>
             </a:fld>
             <a:endParaRPr lang="en-US"/>
           </a:p>
@@ -2099,7 +2098,7 @@
           <a:p>
             <a:fld id="{8CCA23B4-60B8-465C-B45F-AA27EB463BD9}" type="datetimeFigureOut">
               <a:rPr lang="en-US" smtClean="0"/>
-              <a:t>7/2/2021</a:t>
+              <a:t>2/6/2022</a:t>
             </a:fld>
             <a:endParaRPr lang="en-US"/>
           </a:p>
@@ -2356,7 +2355,7 @@
           <a:p>
             <a:fld id="{8CCA23B4-60B8-465C-B45F-AA27EB463BD9}" type="datetimeFigureOut">
               <a:rPr lang="en-US" smtClean="0"/>
-              <a:t>7/2/2021</a:t>
+              <a:t>2/6/2022</a:t>
             </a:fld>
             <a:endParaRPr lang="en-US"/>
           </a:p>
@@ -2569,7 +2568,7 @@
           <a:p>
             <a:fld id="{8CCA23B4-60B8-465C-B45F-AA27EB463BD9}" type="datetimeFigureOut">
               <a:rPr lang="en-US" smtClean="0"/>
-              <a:t>7/2/2021</a:t>
+              <a:t>2/6/2022</a:t>
             </a:fld>
             <a:endParaRPr lang="en-US"/>
           </a:p>
@@ -3220,227 +3219,6 @@
 </p:sld>
 </file>
 
-<file path=ppt/slides/slide2.xml><?xml version="1.0" encoding="utf-8"?>
-<p:sld xmlns:a="http://schemas.openxmlformats.org/drawingml/2006/main" xmlns:r="http://schemas.openxmlformats.org/officeDocument/2006/relationships" xmlns:p="http://schemas.openxmlformats.org/presentationml/2006/main">
-  <p:cSld>
-    <p:spTree>
-      <p:nvGrpSpPr>
-        <p:cNvPr id="1" name=""/>
-        <p:cNvGrpSpPr/>
-        <p:nvPr/>
-      </p:nvGrpSpPr>
-      <p:grpSpPr>
-        <a:xfrm>
-          <a:off x="0" y="0"/>
-          <a:ext cx="0" cy="0"/>
-          <a:chOff x="0" y="0"/>
-          <a:chExt cx="0" cy="0"/>
-        </a:xfrm>
-      </p:grpSpPr>
-      <p:pic>
-        <p:nvPicPr>
-          <p:cNvPr id="14" name="Picture 13">
-            <a:extLst>
-              <a:ext uri="{FF2B5EF4-FFF2-40B4-BE49-F238E27FC236}">
-                <a16:creationId xmlns:a16="http://schemas.microsoft.com/office/drawing/2014/main" id="{A4B077D5-4C6C-4A98-AED8-0E79132F5782}"/>
-              </a:ext>
-            </a:extLst>
-          </p:cNvPr>
-          <p:cNvPicPr>
-            <a:picLocks noChangeAspect="1"/>
-          </p:cNvPicPr>
-          <p:nvPr/>
-        </p:nvPicPr>
-        <p:blipFill>
-          <a:blip r:embed="rId2"/>
-          <a:stretch>
-            <a:fillRect/>
-          </a:stretch>
-        </p:blipFill>
-        <p:spPr>
-          <a:xfrm>
-            <a:off x="542865" y="-457200"/>
-            <a:ext cx="10455461" cy="10149840"/>
-          </a:xfrm>
-          <a:prstGeom prst="rect">
-            <a:avLst/>
-          </a:prstGeom>
-        </p:spPr>
-      </p:pic>
-      <p:pic>
-        <p:nvPicPr>
-          <p:cNvPr id="3" name="Picture 2">
-            <a:extLst>
-              <a:ext uri="{FF2B5EF4-FFF2-40B4-BE49-F238E27FC236}">
-                <a16:creationId xmlns:a16="http://schemas.microsoft.com/office/drawing/2014/main" id="{8C9478FF-013B-4C36-8795-39F14A740D34}"/>
-              </a:ext>
-            </a:extLst>
-          </p:cNvPr>
-          <p:cNvPicPr>
-            <a:picLocks noChangeAspect="1"/>
-          </p:cNvPicPr>
-          <p:nvPr/>
-        </p:nvPicPr>
-        <p:blipFill rotWithShape="1">
-          <a:blip r:embed="rId3"/>
-          <a:srcRect t="16052" r="7520"/>
-          <a:stretch/>
-        </p:blipFill>
-        <p:spPr>
-          <a:xfrm>
-            <a:off x="1576832" y="5252384"/>
-            <a:ext cx="3262769" cy="3204979"/>
-          </a:xfrm>
-          <a:prstGeom prst="rect">
-            <a:avLst/>
-          </a:prstGeom>
-        </p:spPr>
-      </p:pic>
-      <p:sp>
-        <p:nvSpPr>
-          <p:cNvPr id="26" name="TextBox 25">
-            <a:extLst>
-              <a:ext uri="{FF2B5EF4-FFF2-40B4-BE49-F238E27FC236}">
-                <a16:creationId xmlns:a16="http://schemas.microsoft.com/office/drawing/2014/main" id="{130F62BE-96C9-4DD4-A49E-23CC419776BA}"/>
-              </a:ext>
-            </a:extLst>
-          </p:cNvPr>
-          <p:cNvSpPr txBox="1"/>
-          <p:nvPr/>
-        </p:nvSpPr>
-        <p:spPr>
-          <a:xfrm>
-            <a:off x="1576830" y="396240"/>
-            <a:ext cx="801872" cy="523220"/>
-          </a:xfrm>
-          <a:prstGeom prst="rect">
-            <a:avLst/>
-          </a:prstGeom>
-          <a:noFill/>
-        </p:spPr>
-        <p:txBody>
-          <a:bodyPr wrap="square" rtlCol="0">
-            <a:spAutoFit/>
-          </a:bodyPr>
-          <a:lstStyle/>
-          <a:p>
-            <a:r>
-              <a:rPr lang="en-US" sz="2800" dirty="0">
-                <a:latin typeface="Manrope Medium" pitchFamily="2" charset="0"/>
-              </a:rPr>
-              <a:t>(A)</a:t>
-            </a:r>
-          </a:p>
-        </p:txBody>
-      </p:sp>
-      <p:pic>
-        <p:nvPicPr>
-          <p:cNvPr id="6" name="Picture 5">
-            <a:extLst>
-              <a:ext uri="{FF2B5EF4-FFF2-40B4-BE49-F238E27FC236}">
-                <a16:creationId xmlns:a16="http://schemas.microsoft.com/office/drawing/2014/main" id="{193C72FF-F777-412F-89F6-D4F31A3C362F}"/>
-              </a:ext>
-            </a:extLst>
-          </p:cNvPr>
-          <p:cNvPicPr>
-            <a:picLocks noChangeAspect="1"/>
-          </p:cNvPicPr>
-          <p:nvPr/>
-        </p:nvPicPr>
-        <p:blipFill rotWithShape="1">
-          <a:blip r:embed="rId4"/>
-          <a:srcRect l="6414"/>
-          <a:stretch/>
-        </p:blipFill>
-        <p:spPr>
-          <a:xfrm>
-            <a:off x="10277212" y="-480060"/>
-            <a:ext cx="9828977" cy="10195560"/>
-          </a:xfrm>
-          <a:prstGeom prst="rect">
-            <a:avLst/>
-          </a:prstGeom>
-        </p:spPr>
-      </p:pic>
-      <p:pic>
-        <p:nvPicPr>
-          <p:cNvPr id="8" name="Picture 7">
-            <a:extLst>
-              <a:ext uri="{FF2B5EF4-FFF2-40B4-BE49-F238E27FC236}">
-                <a16:creationId xmlns:a16="http://schemas.microsoft.com/office/drawing/2014/main" id="{944D5038-3169-4F29-BD47-8A782892D0EA}"/>
-              </a:ext>
-            </a:extLst>
-          </p:cNvPr>
-          <p:cNvPicPr>
-            <a:picLocks noChangeAspect="1"/>
-          </p:cNvPicPr>
-          <p:nvPr/>
-        </p:nvPicPr>
-        <p:blipFill rotWithShape="1">
-          <a:blip r:embed="rId5"/>
-          <a:srcRect t="16020" r="8149"/>
-          <a:stretch/>
-        </p:blipFill>
-        <p:spPr>
-          <a:xfrm>
-            <a:off x="10690734" y="5252384"/>
-            <a:ext cx="3241014" cy="3204979"/>
-          </a:xfrm>
-          <a:prstGeom prst="rect">
-            <a:avLst/>
-          </a:prstGeom>
-        </p:spPr>
-      </p:pic>
-      <p:sp>
-        <p:nvSpPr>
-          <p:cNvPr id="27" name="TextBox 26">
-            <a:extLst>
-              <a:ext uri="{FF2B5EF4-FFF2-40B4-BE49-F238E27FC236}">
-                <a16:creationId xmlns:a16="http://schemas.microsoft.com/office/drawing/2014/main" id="{F5B0B521-71E5-43C5-964C-0ED5BBBF162B}"/>
-              </a:ext>
-            </a:extLst>
-          </p:cNvPr>
-          <p:cNvSpPr txBox="1"/>
-          <p:nvPr/>
-        </p:nvSpPr>
-        <p:spPr>
-          <a:xfrm>
-            <a:off x="10695618" y="396240"/>
-            <a:ext cx="801872" cy="523220"/>
-          </a:xfrm>
-          <a:prstGeom prst="rect">
-            <a:avLst/>
-          </a:prstGeom>
-          <a:noFill/>
-        </p:spPr>
-        <p:txBody>
-          <a:bodyPr wrap="square" rtlCol="0">
-            <a:spAutoFit/>
-          </a:bodyPr>
-          <a:lstStyle/>
-          <a:p>
-            <a:r>
-              <a:rPr lang="en-US" sz="2800" dirty="0">
-                <a:latin typeface="Manrope Medium" pitchFamily="2" charset="0"/>
-              </a:rPr>
-              <a:t>(B)</a:t>
-            </a:r>
-          </a:p>
-        </p:txBody>
-      </p:sp>
-    </p:spTree>
-    <p:extLst>
-      <p:ext uri="{BB962C8B-B14F-4D97-AF65-F5344CB8AC3E}">
-        <p14:creationId xmlns:p14="http://schemas.microsoft.com/office/powerpoint/2010/main" val="2465947727"/>
-      </p:ext>
-    </p:extLst>
-  </p:cSld>
-  <p:clrMapOvr>
-    <a:masterClrMapping/>
-  </p:clrMapOvr>
-</p:sld>
-</file>
-
 <file path=ppt/theme/theme1.xml><?xml version="1.0" encoding="utf-8"?>
 <a:theme xmlns:a="http://schemas.openxmlformats.org/drawingml/2006/main" name="Office Theme">
   <a:themeElements>

</xml_diff>